<commit_message>
Map religion and body type data into new coloumns
</commit_message>
<xml_diff>
--- a/Presentation.pptx
+++ b/Presentation.pptx
@@ -5,13 +5,16 @@
     <p:sldMasterId id="2147483648" r:id="rId1"/>
   </p:sldMasterIdLst>
   <p:notesMasterIdLst>
-    <p:notesMasterId r:id="rId6"/>
+    <p:notesMasterId r:id="rId9"/>
   </p:notesMasterIdLst>
   <p:sldIdLst>
     <p:sldId id="256" r:id="rId2"/>
     <p:sldId id="257" r:id="rId3"/>
     <p:sldId id="258" r:id="rId4"/>
     <p:sldId id="259" r:id="rId5"/>
+    <p:sldId id="260" r:id="rId6"/>
+    <p:sldId id="261" r:id="rId7"/>
+    <p:sldId id="262" r:id="rId8"/>
   </p:sldIdLst>
   <p:sldSz cx="12192000" cy="6858000"/>
   <p:notesSz cx="6858000" cy="9144000"/>
@@ -110,6 +113,11 @@
       </a:defRPr>
     </a:lvl9pPr>
   </p:defaultTextStyle>
+  <p:extLst>
+    <p:ext uri="{EFAFB233-063F-42B5-8137-9DF3F51BA10A}">
+      <p15:sldGuideLst xmlns:p15="http://schemas.microsoft.com/office/powerpoint/2012/main"/>
+    </p:ext>
+  </p:extLst>
 </p:presentation>
 </file>
 
@@ -3682,7 +3690,11 @@
           <a:p>
             <a:r>
               <a:rPr lang="en-US" dirty="0" smtClean="0"/>
-              <a:t>Question(s) to Answer</a:t>
+              <a:t>Question </a:t>
+            </a:r>
+            <a:r>
+              <a:rPr lang="en-US" dirty="0" smtClean="0"/>
+              <a:t>to Answer</a:t>
             </a:r>
           </a:p>
           <a:p>
@@ -4010,6 +4022,1700 @@
     <p:extLst>
       <p:ext uri="{BB962C8B-B14F-4D97-AF65-F5344CB8AC3E}">
         <p14:creationId xmlns:p14="http://schemas.microsoft.com/office/powerpoint/2010/main" val="3152670691"/>
+      </p:ext>
+    </p:extLst>
+  </p:cSld>
+  <p:clrMapOvr>
+    <a:masterClrMapping/>
+  </p:clrMapOvr>
+</p:sld>
+</file>
+
+<file path=ppt/slides/slide5.xml><?xml version="1.0" encoding="utf-8"?>
+<p:sld xmlns:a="http://schemas.openxmlformats.org/drawingml/2006/main" xmlns:r="http://schemas.openxmlformats.org/officeDocument/2006/relationships" xmlns:p="http://schemas.openxmlformats.org/presentationml/2006/main">
+  <p:cSld>
+    <p:spTree>
+      <p:nvGrpSpPr>
+        <p:cNvPr id="1" name=""/>
+        <p:cNvGrpSpPr/>
+        <p:nvPr/>
+      </p:nvGrpSpPr>
+      <p:grpSpPr>
+        <a:xfrm>
+          <a:off x="0" y="0"/>
+          <a:ext cx="0" cy="0"/>
+          <a:chOff x="0" y="0"/>
+          <a:chExt cx="0" cy="0"/>
+        </a:xfrm>
+      </p:grpSpPr>
+      <p:sp>
+        <p:nvSpPr>
+          <p:cNvPr id="2" name="Title 1"/>
+          <p:cNvSpPr>
+            <a:spLocks noGrp="1"/>
+          </p:cNvSpPr>
+          <p:nvPr>
+            <p:ph type="title"/>
+          </p:nvPr>
+        </p:nvSpPr>
+        <p:spPr/>
+        <p:txBody>
+          <a:bodyPr/>
+          <a:lstStyle/>
+          <a:p>
+            <a:r>
+              <a:rPr lang="en-US" dirty="0" smtClean="0"/>
+              <a:t>Question </a:t>
+            </a:r>
+            <a:r>
+              <a:rPr lang="en-US" dirty="0"/>
+              <a:t>to Answer</a:t>
+            </a:r>
+            <a:endParaRPr lang="da-DK" dirty="0"/>
+          </a:p>
+        </p:txBody>
+      </p:sp>
+      <p:sp>
+        <p:nvSpPr>
+          <p:cNvPr id="3" name="Content Placeholder 2"/>
+          <p:cNvSpPr>
+            <a:spLocks noGrp="1"/>
+          </p:cNvSpPr>
+          <p:nvPr>
+            <p:ph sz="half" idx="1"/>
+          </p:nvPr>
+        </p:nvSpPr>
+        <p:spPr>
+          <a:xfrm>
+            <a:off x="838200" y="1825625"/>
+            <a:ext cx="10515600" cy="4351338"/>
+          </a:xfrm>
+        </p:spPr>
+        <p:txBody>
+          <a:bodyPr/>
+          <a:lstStyle/>
+          <a:p>
+            <a:pPr marL="0" indent="0">
+              <a:buNone/>
+            </a:pPr>
+            <a:r>
+              <a:rPr lang="en-US" dirty="0" smtClean="0"/>
+              <a:t>Out from my exploration of the dataset in the described graphs, I could not see any correlation between diet and income, by looking at the mean income of each diet type.</a:t>
+            </a:r>
+          </a:p>
+          <a:p>
+            <a:pPr marL="0" indent="0">
+              <a:buNone/>
+            </a:pPr>
+            <a:endParaRPr lang="en-US" dirty="0" smtClean="0"/>
+          </a:p>
+          <a:p>
+            <a:pPr marL="0" indent="0">
+              <a:buNone/>
+            </a:pPr>
+            <a:r>
+              <a:rPr lang="en-US" dirty="0" smtClean="0"/>
+              <a:t>By looking at the different body types, I thought it would be a better idea to use this.</a:t>
+            </a:r>
+          </a:p>
+          <a:p>
+            <a:pPr marL="0" indent="0">
+              <a:buNone/>
+            </a:pPr>
+            <a:endParaRPr lang="en-US" dirty="0" smtClean="0"/>
+          </a:p>
+          <a:p>
+            <a:r>
+              <a:rPr lang="en-US" dirty="0" smtClean="0"/>
+              <a:t>Can I predict a user’s diet by looking at body type and maybe other </a:t>
+            </a:r>
+            <a:r>
+              <a:rPr lang="en-US" dirty="0" err="1" smtClean="0"/>
+              <a:t>informations</a:t>
+            </a:r>
+            <a:r>
+              <a:rPr lang="en-US" dirty="0" smtClean="0"/>
+              <a:t> from their profile?</a:t>
+            </a:r>
+            <a:endParaRPr lang="en-US" dirty="0"/>
+          </a:p>
+        </p:txBody>
+      </p:sp>
+    </p:spTree>
+    <p:extLst>
+      <p:ext uri="{BB962C8B-B14F-4D97-AF65-F5344CB8AC3E}">
+        <p14:creationId xmlns:p14="http://schemas.microsoft.com/office/powerpoint/2010/main" val="882623569"/>
+      </p:ext>
+    </p:extLst>
+  </p:cSld>
+  <p:clrMapOvr>
+    <a:masterClrMapping/>
+  </p:clrMapOvr>
+</p:sld>
+</file>
+
+<file path=ppt/slides/slide6.xml><?xml version="1.0" encoding="utf-8"?>
+<p:sld xmlns:a="http://schemas.openxmlformats.org/drawingml/2006/main" xmlns:r="http://schemas.openxmlformats.org/officeDocument/2006/relationships" xmlns:p="http://schemas.openxmlformats.org/presentationml/2006/main">
+  <p:cSld>
+    <p:spTree>
+      <p:nvGrpSpPr>
+        <p:cNvPr id="1" name=""/>
+        <p:cNvGrpSpPr/>
+        <p:nvPr/>
+      </p:nvGrpSpPr>
+      <p:grpSpPr>
+        <a:xfrm>
+          <a:off x="0" y="0"/>
+          <a:ext cx="0" cy="0"/>
+          <a:chOff x="0" y="0"/>
+          <a:chExt cx="0" cy="0"/>
+        </a:xfrm>
+      </p:grpSpPr>
+      <p:sp>
+        <p:nvSpPr>
+          <p:cNvPr id="2" name="Title 1"/>
+          <p:cNvSpPr>
+            <a:spLocks noGrp="1"/>
+          </p:cNvSpPr>
+          <p:nvPr>
+            <p:ph type="title"/>
+          </p:nvPr>
+        </p:nvSpPr>
+        <p:spPr/>
+        <p:txBody>
+          <a:bodyPr/>
+          <a:lstStyle/>
+          <a:p>
+            <a:r>
+              <a:rPr lang="en-US" dirty="0" smtClean="0"/>
+              <a:t>Augmenting the Dataset</a:t>
+            </a:r>
+            <a:br>
+              <a:rPr lang="en-US" dirty="0" smtClean="0"/>
+            </a:br>
+            <a:r>
+              <a:rPr lang="en-US" sz="2000" dirty="0" smtClean="0"/>
+              <a:t>Religion mapping</a:t>
+            </a:r>
+            <a:endParaRPr lang="da-DK" dirty="0"/>
+          </a:p>
+        </p:txBody>
+      </p:sp>
+      <p:graphicFrame>
+        <p:nvGraphicFramePr>
+          <p:cNvPr id="5" name="Content Placeholder 4"/>
+          <p:cNvGraphicFramePr>
+            <a:graphicFrameLocks noGrp="1"/>
+          </p:cNvGraphicFramePr>
+          <p:nvPr>
+            <p:ph sz="half" idx="1"/>
+            <p:extLst>
+              <p:ext uri="{D42A27DB-BD31-4B8C-83A1-F6EECF244321}">
+                <p14:modId xmlns:p14="http://schemas.microsoft.com/office/powerpoint/2010/main" val="200577286"/>
+              </p:ext>
+            </p:extLst>
+          </p:nvPr>
+        </p:nvGraphicFramePr>
+        <p:xfrm>
+          <a:off x="838200" y="1690688"/>
+          <a:ext cx="10515600" cy="2225040"/>
+        </p:xfrm>
+        <a:graphic>
+          <a:graphicData uri="http://schemas.openxmlformats.org/drawingml/2006/table">
+            <a:tbl>
+              <a:tblPr firstRow="1" bandRow="1">
+                <a:tableStyleId>{5C22544A-7EE6-4342-B048-85BDC9FD1C3A}</a:tableStyleId>
+              </a:tblPr>
+              <a:tblGrid>
+                <a:gridCol w="3505200">
+                  <a:extLst>
+                    <a:ext uri="{9D8B030D-6E8A-4147-A177-3AD203B41FA5}">
+                      <a16:colId xmlns:a16="http://schemas.microsoft.com/office/drawing/2014/main" val="2072441976"/>
+                    </a:ext>
+                  </a:extLst>
+                </a:gridCol>
+                <a:gridCol w="3505200">
+                  <a:extLst>
+                    <a:ext uri="{9D8B030D-6E8A-4147-A177-3AD203B41FA5}">
+                      <a16:colId xmlns:a16="http://schemas.microsoft.com/office/drawing/2014/main" val="4092204706"/>
+                    </a:ext>
+                  </a:extLst>
+                </a:gridCol>
+                <a:gridCol w="3505200">
+                  <a:extLst>
+                    <a:ext uri="{9D8B030D-6E8A-4147-A177-3AD203B41FA5}">
+                      <a16:colId xmlns:a16="http://schemas.microsoft.com/office/drawing/2014/main" val="3140183693"/>
+                    </a:ext>
+                  </a:extLst>
+                </a:gridCol>
+              </a:tblGrid>
+              <a:tr h="370840">
+                <a:tc>
+                  <a:txBody>
+                    <a:bodyPr/>
+                    <a:lstStyle/>
+                    <a:p>
+                      <a:r>
+                        <a:rPr lang="da-DK" dirty="0" smtClean="0"/>
+                        <a:t>User</a:t>
+                      </a:r>
+                      <a:endParaRPr lang="da-DK" dirty="0"/>
+                    </a:p>
+                  </a:txBody>
+                  <a:tcPr/>
+                </a:tc>
+                <a:tc>
+                  <a:txBody>
+                    <a:bodyPr/>
+                    <a:lstStyle/>
+                    <a:p>
+                      <a:r>
+                        <a:rPr lang="da-DK" dirty="0" smtClean="0"/>
+                        <a:t>Religion </a:t>
+                      </a:r>
+                      <a:r>
+                        <a:rPr lang="da-DK" dirty="0" err="1" smtClean="0"/>
+                        <a:t>containing</a:t>
+                      </a:r>
+                      <a:endParaRPr lang="da-DK" dirty="0"/>
+                    </a:p>
+                  </a:txBody>
+                  <a:tcPr/>
+                </a:tc>
+                <a:tc>
+                  <a:txBody>
+                    <a:bodyPr/>
+                    <a:lstStyle/>
+                    <a:p>
+                      <a:r>
+                        <a:rPr lang="da-DK" dirty="0" smtClean="0"/>
+                        <a:t>Religion</a:t>
+                      </a:r>
+                      <a:r>
+                        <a:rPr lang="da-DK" baseline="0" dirty="0" smtClean="0"/>
+                        <a:t> </a:t>
+                      </a:r>
+                      <a:r>
+                        <a:rPr lang="da-DK" baseline="0" dirty="0" err="1" smtClean="0"/>
+                        <a:t>seriousness</a:t>
+                      </a:r>
+                      <a:endParaRPr lang="da-DK" dirty="0"/>
+                    </a:p>
+                  </a:txBody>
+                  <a:tcPr/>
+                </a:tc>
+                <a:extLst>
+                  <a:ext uri="{0D108BD9-81ED-4DB2-BD59-A6C34878D82A}">
+                    <a16:rowId xmlns:a16="http://schemas.microsoft.com/office/drawing/2014/main" val="2320993942"/>
+                  </a:ext>
+                </a:extLst>
+              </a:tr>
+              <a:tr h="370840">
+                <a:tc>
+                  <a:txBody>
+                    <a:bodyPr/>
+                    <a:lstStyle/>
+                    <a:p>
+                      <a:r>
+                        <a:rPr lang="da-DK" b="1" dirty="0" smtClean="0"/>
+                        <a:t>0</a:t>
+                      </a:r>
+                      <a:endParaRPr lang="da-DK" b="1" dirty="0"/>
+                    </a:p>
+                  </a:txBody>
+                  <a:tcPr/>
+                </a:tc>
+                <a:tc>
+                  <a:txBody>
+                    <a:bodyPr/>
+                    <a:lstStyle/>
+                    <a:p>
+                      <a:r>
+                        <a:rPr lang="da-DK" dirty="0" err="1" smtClean="0"/>
+                        <a:t>Laughing</a:t>
+                      </a:r>
+                      <a:r>
+                        <a:rPr lang="da-DK" dirty="0" smtClean="0"/>
+                        <a:t> </a:t>
+                      </a:r>
+                      <a:r>
+                        <a:rPr lang="da-DK" dirty="0" err="1" smtClean="0"/>
+                        <a:t>about</a:t>
+                      </a:r>
+                      <a:r>
+                        <a:rPr lang="da-DK" dirty="0" smtClean="0"/>
+                        <a:t> it</a:t>
+                      </a:r>
+                      <a:endParaRPr lang="da-DK" dirty="0"/>
+                    </a:p>
+                  </a:txBody>
+                  <a:tcPr/>
+                </a:tc>
+                <a:tc>
+                  <a:txBody>
+                    <a:bodyPr/>
+                    <a:lstStyle/>
+                    <a:p>
+                      <a:r>
+                        <a:rPr lang="da-DK" dirty="0" smtClean="0"/>
+                        <a:t>0</a:t>
+                      </a:r>
+                      <a:endParaRPr lang="da-DK" dirty="0"/>
+                    </a:p>
+                  </a:txBody>
+                  <a:tcPr/>
+                </a:tc>
+                <a:extLst>
+                  <a:ext uri="{0D108BD9-81ED-4DB2-BD59-A6C34878D82A}">
+                    <a16:rowId xmlns:a16="http://schemas.microsoft.com/office/drawing/2014/main" val="3967622235"/>
+                  </a:ext>
+                </a:extLst>
+              </a:tr>
+              <a:tr h="370840">
+                <a:tc>
+                  <a:txBody>
+                    <a:bodyPr/>
+                    <a:lstStyle/>
+                    <a:p>
+                      <a:r>
+                        <a:rPr lang="da-DK" b="1" dirty="0" smtClean="0"/>
+                        <a:t>1</a:t>
+                      </a:r>
+                      <a:endParaRPr lang="da-DK" b="1" dirty="0"/>
+                    </a:p>
+                  </a:txBody>
+                  <a:tcPr/>
+                </a:tc>
+                <a:tc>
+                  <a:txBody>
+                    <a:bodyPr/>
+                    <a:lstStyle/>
+                    <a:p>
+                      <a:r>
+                        <a:rPr lang="da-DK" dirty="0" smtClean="0"/>
+                        <a:t>Not </a:t>
+                      </a:r>
+                      <a:r>
+                        <a:rPr lang="da-DK" dirty="0" err="1" smtClean="0"/>
+                        <a:t>too</a:t>
+                      </a:r>
+                      <a:r>
+                        <a:rPr lang="da-DK" dirty="0" smtClean="0"/>
+                        <a:t> </a:t>
+                      </a:r>
+                      <a:r>
+                        <a:rPr lang="da-DK" dirty="0" err="1" smtClean="0"/>
+                        <a:t>serious</a:t>
+                      </a:r>
+                      <a:r>
+                        <a:rPr lang="da-DK" dirty="0" smtClean="0"/>
+                        <a:t> </a:t>
+                      </a:r>
+                      <a:r>
+                        <a:rPr lang="da-DK" dirty="0" err="1" smtClean="0"/>
+                        <a:t>about</a:t>
+                      </a:r>
+                      <a:r>
+                        <a:rPr lang="da-DK" dirty="0" smtClean="0"/>
+                        <a:t> it</a:t>
+                      </a:r>
+                      <a:endParaRPr lang="da-DK" dirty="0"/>
+                    </a:p>
+                  </a:txBody>
+                  <a:tcPr/>
+                </a:tc>
+                <a:tc>
+                  <a:txBody>
+                    <a:bodyPr/>
+                    <a:lstStyle/>
+                    <a:p>
+                      <a:r>
+                        <a:rPr lang="da-DK" dirty="0" smtClean="0"/>
+                        <a:t>1</a:t>
+                      </a:r>
+                      <a:endParaRPr lang="da-DK" dirty="0"/>
+                    </a:p>
+                  </a:txBody>
+                  <a:tcPr/>
+                </a:tc>
+                <a:extLst>
+                  <a:ext uri="{0D108BD9-81ED-4DB2-BD59-A6C34878D82A}">
+                    <a16:rowId xmlns:a16="http://schemas.microsoft.com/office/drawing/2014/main" val="3997787615"/>
+                  </a:ext>
+                </a:extLst>
+              </a:tr>
+              <a:tr h="370840">
+                <a:tc>
+                  <a:txBody>
+                    <a:bodyPr/>
+                    <a:lstStyle/>
+                    <a:p>
+                      <a:r>
+                        <a:rPr lang="da-DK" b="1" dirty="0" smtClean="0"/>
+                        <a:t>2</a:t>
+                      </a:r>
+                      <a:endParaRPr lang="da-DK" b="1" dirty="0"/>
+                    </a:p>
+                  </a:txBody>
+                  <a:tcPr/>
+                </a:tc>
+                <a:tc>
+                  <a:txBody>
+                    <a:bodyPr/>
+                    <a:lstStyle/>
+                    <a:p>
+                      <a:r>
+                        <a:rPr lang="da-DK" dirty="0" smtClean="0"/>
+                        <a:t>No</a:t>
+                      </a:r>
+                      <a:r>
+                        <a:rPr lang="da-DK" baseline="0" dirty="0" smtClean="0"/>
+                        <a:t> statement of </a:t>
+                      </a:r>
+                      <a:r>
+                        <a:rPr lang="da-DK" baseline="0" dirty="0" err="1" smtClean="0"/>
+                        <a:t>seriousness</a:t>
+                      </a:r>
+                      <a:endParaRPr lang="da-DK" dirty="0"/>
+                    </a:p>
+                  </a:txBody>
+                  <a:tcPr/>
+                </a:tc>
+                <a:tc>
+                  <a:txBody>
+                    <a:bodyPr/>
+                    <a:lstStyle/>
+                    <a:p>
+                      <a:r>
+                        <a:rPr lang="da-DK" dirty="0" smtClean="0"/>
+                        <a:t>2</a:t>
+                      </a:r>
+                      <a:endParaRPr lang="da-DK" dirty="0"/>
+                    </a:p>
+                  </a:txBody>
+                  <a:tcPr/>
+                </a:tc>
+                <a:extLst>
+                  <a:ext uri="{0D108BD9-81ED-4DB2-BD59-A6C34878D82A}">
+                    <a16:rowId xmlns:a16="http://schemas.microsoft.com/office/drawing/2014/main" val="2407477255"/>
+                  </a:ext>
+                </a:extLst>
+              </a:tr>
+              <a:tr h="370840">
+                <a:tc>
+                  <a:txBody>
+                    <a:bodyPr/>
+                    <a:lstStyle/>
+                    <a:p>
+                      <a:r>
+                        <a:rPr lang="da-DK" b="1" dirty="0" smtClean="0"/>
+                        <a:t>3</a:t>
+                      </a:r>
+                      <a:endParaRPr lang="da-DK" b="1" dirty="0"/>
+                    </a:p>
+                  </a:txBody>
+                  <a:tcPr/>
+                </a:tc>
+                <a:tc>
+                  <a:txBody>
+                    <a:bodyPr/>
+                    <a:lstStyle/>
+                    <a:p>
+                      <a:r>
+                        <a:rPr lang="da-DK" dirty="0" err="1" smtClean="0"/>
+                        <a:t>Somewhat</a:t>
+                      </a:r>
+                      <a:r>
+                        <a:rPr lang="da-DK" baseline="0" dirty="0" smtClean="0"/>
+                        <a:t> </a:t>
+                      </a:r>
+                      <a:r>
+                        <a:rPr lang="da-DK" baseline="0" dirty="0" err="1" smtClean="0"/>
+                        <a:t>serious</a:t>
+                      </a:r>
+                      <a:r>
+                        <a:rPr lang="da-DK" baseline="0" dirty="0" smtClean="0"/>
+                        <a:t> </a:t>
+                      </a:r>
+                      <a:r>
+                        <a:rPr lang="da-DK" baseline="0" dirty="0" err="1" smtClean="0"/>
+                        <a:t>about</a:t>
+                      </a:r>
+                      <a:r>
+                        <a:rPr lang="da-DK" baseline="0" dirty="0" smtClean="0"/>
+                        <a:t> it</a:t>
+                      </a:r>
+                      <a:endParaRPr lang="da-DK" dirty="0"/>
+                    </a:p>
+                  </a:txBody>
+                  <a:tcPr/>
+                </a:tc>
+                <a:tc>
+                  <a:txBody>
+                    <a:bodyPr/>
+                    <a:lstStyle/>
+                    <a:p>
+                      <a:r>
+                        <a:rPr lang="da-DK" dirty="0" smtClean="0"/>
+                        <a:t>3</a:t>
+                      </a:r>
+                      <a:endParaRPr lang="da-DK" dirty="0"/>
+                    </a:p>
+                  </a:txBody>
+                  <a:tcPr/>
+                </a:tc>
+                <a:extLst>
+                  <a:ext uri="{0D108BD9-81ED-4DB2-BD59-A6C34878D82A}">
+                    <a16:rowId xmlns:a16="http://schemas.microsoft.com/office/drawing/2014/main" val="432184142"/>
+                  </a:ext>
+                </a:extLst>
+              </a:tr>
+              <a:tr h="370840">
+                <a:tc>
+                  <a:txBody>
+                    <a:bodyPr/>
+                    <a:lstStyle/>
+                    <a:p>
+                      <a:r>
+                        <a:rPr lang="da-DK" b="1" dirty="0" smtClean="0"/>
+                        <a:t>4</a:t>
+                      </a:r>
+                      <a:endParaRPr lang="da-DK" b="1" dirty="0"/>
+                    </a:p>
+                  </a:txBody>
+                  <a:tcPr/>
+                </a:tc>
+                <a:tc>
+                  <a:txBody>
+                    <a:bodyPr/>
+                    <a:lstStyle/>
+                    <a:p>
+                      <a:r>
+                        <a:rPr lang="da-DK" dirty="0" err="1" smtClean="0"/>
+                        <a:t>Very</a:t>
+                      </a:r>
+                      <a:r>
+                        <a:rPr lang="da-DK" baseline="0" dirty="0" smtClean="0"/>
+                        <a:t> </a:t>
+                      </a:r>
+                      <a:r>
+                        <a:rPr lang="da-DK" baseline="0" dirty="0" err="1" smtClean="0"/>
+                        <a:t>serious</a:t>
+                      </a:r>
+                      <a:r>
+                        <a:rPr lang="da-DK" baseline="0" dirty="0" smtClean="0"/>
+                        <a:t> </a:t>
+                      </a:r>
+                      <a:r>
+                        <a:rPr lang="da-DK" baseline="0" dirty="0" err="1" smtClean="0"/>
+                        <a:t>about</a:t>
+                      </a:r>
+                      <a:r>
+                        <a:rPr lang="da-DK" baseline="0" dirty="0" smtClean="0"/>
+                        <a:t> it</a:t>
+                      </a:r>
+                      <a:endParaRPr lang="da-DK" dirty="0"/>
+                    </a:p>
+                  </a:txBody>
+                  <a:tcPr/>
+                </a:tc>
+                <a:tc>
+                  <a:txBody>
+                    <a:bodyPr/>
+                    <a:lstStyle/>
+                    <a:p>
+                      <a:r>
+                        <a:rPr lang="da-DK" dirty="0" smtClean="0"/>
+                        <a:t>4</a:t>
+                      </a:r>
+                      <a:endParaRPr lang="da-DK" dirty="0"/>
+                    </a:p>
+                  </a:txBody>
+                  <a:tcPr/>
+                </a:tc>
+                <a:extLst>
+                  <a:ext uri="{0D108BD9-81ED-4DB2-BD59-A6C34878D82A}">
+                    <a16:rowId xmlns:a16="http://schemas.microsoft.com/office/drawing/2014/main" val="432828981"/>
+                  </a:ext>
+                </a:extLst>
+              </a:tr>
+            </a:tbl>
+          </a:graphicData>
+        </a:graphic>
+      </p:graphicFrame>
+      <p:sp>
+        <p:nvSpPr>
+          <p:cNvPr id="6" name="TextBox 5"/>
+          <p:cNvSpPr txBox="1"/>
+          <p:nvPr/>
+        </p:nvSpPr>
+        <p:spPr>
+          <a:xfrm>
+            <a:off x="838200" y="4484913"/>
+            <a:ext cx="10515600" cy="1200329"/>
+          </a:xfrm>
+          <a:prstGeom prst="rect">
+            <a:avLst/>
+          </a:prstGeom>
+          <a:noFill/>
+        </p:spPr>
+        <p:txBody>
+          <a:bodyPr wrap="square" rtlCol="0">
+            <a:spAutoFit/>
+          </a:bodyPr>
+          <a:lstStyle/>
+          <a:p>
+            <a:r>
+              <a:rPr lang="da-DK" dirty="0" smtClean="0"/>
+              <a:t>I </a:t>
+            </a:r>
+            <a:r>
+              <a:rPr lang="da-DK" dirty="0" err="1" smtClean="0"/>
+              <a:t>thought</a:t>
+            </a:r>
+            <a:r>
+              <a:rPr lang="da-DK" dirty="0" smtClean="0"/>
+              <a:t> that religion </a:t>
+            </a:r>
+            <a:r>
+              <a:rPr lang="da-DK" dirty="0" err="1" smtClean="0"/>
+              <a:t>seriousness</a:t>
+            </a:r>
+            <a:r>
+              <a:rPr lang="da-DK" dirty="0" smtClean="0"/>
+              <a:t> </a:t>
+            </a:r>
+            <a:r>
+              <a:rPr lang="da-DK" dirty="0" err="1" smtClean="0"/>
+              <a:t>can</a:t>
+            </a:r>
+            <a:r>
+              <a:rPr lang="da-DK" dirty="0" smtClean="0"/>
+              <a:t> </a:t>
+            </a:r>
+            <a:r>
+              <a:rPr lang="da-DK" dirty="0" err="1" smtClean="0"/>
+              <a:t>be</a:t>
+            </a:r>
+            <a:r>
+              <a:rPr lang="da-DK" dirty="0" smtClean="0"/>
+              <a:t> </a:t>
+            </a:r>
+            <a:r>
+              <a:rPr lang="da-DK" dirty="0" err="1" smtClean="0"/>
+              <a:t>used</a:t>
+            </a:r>
+            <a:r>
+              <a:rPr lang="da-DK" dirty="0" smtClean="0"/>
+              <a:t> for </a:t>
+            </a:r>
+            <a:r>
+              <a:rPr lang="da-DK" dirty="0" err="1" smtClean="0"/>
+              <a:t>predicting</a:t>
+            </a:r>
+            <a:r>
+              <a:rPr lang="da-DK" dirty="0" smtClean="0"/>
+              <a:t> the diet of the </a:t>
+            </a:r>
+            <a:r>
+              <a:rPr lang="da-DK" dirty="0" err="1" smtClean="0"/>
+              <a:t>user</a:t>
+            </a:r>
+            <a:r>
+              <a:rPr lang="da-DK" dirty="0" smtClean="0"/>
+              <a:t>. To </a:t>
+            </a:r>
+            <a:r>
+              <a:rPr lang="da-DK" dirty="0" err="1" smtClean="0"/>
+              <a:t>get</a:t>
+            </a:r>
+            <a:r>
+              <a:rPr lang="da-DK" dirty="0" smtClean="0"/>
+              <a:t> a </a:t>
+            </a:r>
+            <a:r>
+              <a:rPr lang="da-DK" dirty="0" err="1" smtClean="0"/>
+              <a:t>view</a:t>
+            </a:r>
+            <a:r>
+              <a:rPr lang="da-DK" dirty="0" smtClean="0"/>
+              <a:t> of </a:t>
+            </a:r>
+            <a:r>
+              <a:rPr lang="da-DK" dirty="0" err="1" smtClean="0"/>
+              <a:t>how</a:t>
+            </a:r>
+            <a:r>
+              <a:rPr lang="da-DK" dirty="0" smtClean="0"/>
+              <a:t> </a:t>
+            </a:r>
+            <a:r>
+              <a:rPr lang="da-DK" dirty="0" err="1" smtClean="0"/>
+              <a:t>serious</a:t>
+            </a:r>
+            <a:r>
+              <a:rPr lang="da-DK" dirty="0" smtClean="0"/>
+              <a:t> the </a:t>
+            </a:r>
+            <a:r>
+              <a:rPr lang="da-DK" dirty="0" err="1" smtClean="0"/>
+              <a:t>user</a:t>
+            </a:r>
+            <a:r>
+              <a:rPr lang="da-DK" dirty="0" smtClean="0"/>
+              <a:t> is, I </a:t>
+            </a:r>
+            <a:r>
+              <a:rPr lang="da-DK" dirty="0" err="1" smtClean="0"/>
+              <a:t>categorized</a:t>
+            </a:r>
+            <a:r>
+              <a:rPr lang="da-DK" dirty="0" smtClean="0"/>
+              <a:t> it by </a:t>
+            </a:r>
+            <a:r>
+              <a:rPr lang="da-DK" dirty="0" err="1" smtClean="0"/>
+              <a:t>looking</a:t>
+            </a:r>
+            <a:r>
+              <a:rPr lang="da-DK" dirty="0" smtClean="0"/>
+              <a:t> at </a:t>
+            </a:r>
+            <a:r>
+              <a:rPr lang="da-DK" dirty="0" err="1" smtClean="0"/>
+              <a:t>what</a:t>
+            </a:r>
+            <a:r>
+              <a:rPr lang="da-DK" dirty="0" smtClean="0"/>
+              <a:t> the religion </a:t>
+            </a:r>
+            <a:r>
+              <a:rPr lang="da-DK" dirty="0" err="1" smtClean="0"/>
+              <a:t>cells</a:t>
+            </a:r>
+            <a:r>
+              <a:rPr lang="da-DK" dirty="0"/>
+              <a:t> </a:t>
+            </a:r>
+            <a:r>
+              <a:rPr lang="da-DK" dirty="0" err="1" smtClean="0"/>
+              <a:t>contained</a:t>
+            </a:r>
+            <a:r>
+              <a:rPr lang="da-DK" dirty="0" smtClean="0"/>
+              <a:t>. I </a:t>
+            </a:r>
+            <a:r>
+              <a:rPr lang="da-DK" dirty="0" err="1" smtClean="0"/>
+              <a:t>used</a:t>
+            </a:r>
+            <a:r>
+              <a:rPr lang="da-DK" dirty="0" smtClean="0"/>
+              <a:t> </a:t>
+            </a:r>
+            <a:r>
+              <a:rPr lang="da-DK" dirty="0" err="1" smtClean="0"/>
+              <a:t>this</a:t>
+            </a:r>
+            <a:r>
+              <a:rPr lang="da-DK" dirty="0" smtClean="0"/>
+              <a:t> to </a:t>
+            </a:r>
+            <a:r>
+              <a:rPr lang="da-DK" dirty="0" err="1" smtClean="0"/>
+              <a:t>create</a:t>
+            </a:r>
+            <a:r>
+              <a:rPr lang="da-DK" dirty="0" smtClean="0"/>
+              <a:t> the ”Religion </a:t>
+            </a:r>
+            <a:r>
+              <a:rPr lang="da-DK" dirty="0" err="1" smtClean="0"/>
+              <a:t>seriousness</a:t>
+            </a:r>
+            <a:r>
+              <a:rPr lang="da-DK" dirty="0" smtClean="0"/>
+              <a:t>” column, as </a:t>
+            </a:r>
+            <a:r>
+              <a:rPr lang="da-DK" dirty="0" err="1" smtClean="0"/>
+              <a:t>shown</a:t>
+            </a:r>
+            <a:r>
+              <a:rPr lang="da-DK" dirty="0" smtClean="0"/>
+              <a:t> </a:t>
+            </a:r>
+            <a:r>
+              <a:rPr lang="da-DK" dirty="0" err="1" smtClean="0"/>
+              <a:t>above</a:t>
+            </a:r>
+            <a:r>
+              <a:rPr lang="da-DK" dirty="0"/>
+              <a:t> </a:t>
+            </a:r>
+            <a:r>
+              <a:rPr lang="da-DK" dirty="0" smtClean="0"/>
+              <a:t>a </a:t>
+            </a:r>
+            <a:r>
+              <a:rPr lang="da-DK" dirty="0" err="1" smtClean="0"/>
+              <a:t>user</a:t>
+            </a:r>
+            <a:r>
+              <a:rPr lang="da-DK" dirty="0" smtClean="0"/>
+              <a:t> is not </a:t>
+            </a:r>
+            <a:r>
+              <a:rPr lang="da-DK" dirty="0" err="1" smtClean="0"/>
+              <a:t>categorised</a:t>
+            </a:r>
+            <a:r>
+              <a:rPr lang="da-DK" dirty="0" smtClean="0"/>
+              <a:t> </a:t>
+            </a:r>
+            <a:r>
+              <a:rPr lang="da-DK" dirty="0" err="1" smtClean="0"/>
+              <a:t>into</a:t>
+            </a:r>
+            <a:r>
+              <a:rPr lang="da-DK" dirty="0" smtClean="0"/>
+              <a:t> 5 </a:t>
+            </a:r>
+            <a:r>
+              <a:rPr lang="da-DK" dirty="0" err="1" smtClean="0"/>
+              <a:t>different</a:t>
+            </a:r>
+            <a:r>
+              <a:rPr lang="da-DK" dirty="0" smtClean="0"/>
+              <a:t> </a:t>
+            </a:r>
+            <a:r>
+              <a:rPr lang="da-DK" dirty="0" err="1" smtClean="0"/>
+              <a:t>categories</a:t>
+            </a:r>
+            <a:r>
+              <a:rPr lang="da-DK" dirty="0" smtClean="0"/>
+              <a:t>, </a:t>
+            </a:r>
+            <a:r>
+              <a:rPr lang="da-DK" dirty="0" err="1" smtClean="0"/>
+              <a:t>describing</a:t>
+            </a:r>
+            <a:r>
+              <a:rPr lang="da-DK" dirty="0" smtClean="0"/>
+              <a:t> </a:t>
+            </a:r>
+            <a:r>
+              <a:rPr lang="da-DK" dirty="0" err="1" smtClean="0"/>
+              <a:t>how</a:t>
+            </a:r>
+            <a:r>
+              <a:rPr lang="da-DK" dirty="0" smtClean="0"/>
+              <a:t> </a:t>
+            </a:r>
+            <a:r>
+              <a:rPr lang="da-DK" dirty="0" err="1" smtClean="0"/>
+              <a:t>serious</a:t>
+            </a:r>
+            <a:r>
+              <a:rPr lang="da-DK" dirty="0" smtClean="0"/>
+              <a:t> </a:t>
+            </a:r>
+            <a:r>
+              <a:rPr lang="da-DK" dirty="0" err="1" smtClean="0"/>
+              <a:t>they</a:t>
+            </a:r>
+            <a:r>
+              <a:rPr lang="da-DK" dirty="0" smtClean="0"/>
+              <a:t> </a:t>
+            </a:r>
+            <a:r>
+              <a:rPr lang="da-DK" dirty="0" err="1" smtClean="0"/>
+              <a:t>are</a:t>
+            </a:r>
+            <a:r>
+              <a:rPr lang="da-DK" dirty="0" smtClean="0"/>
+              <a:t> </a:t>
+            </a:r>
+            <a:r>
+              <a:rPr lang="da-DK" dirty="0" err="1" smtClean="0"/>
+              <a:t>about</a:t>
+            </a:r>
+            <a:r>
+              <a:rPr lang="da-DK" dirty="0" smtClean="0"/>
+              <a:t> religion.</a:t>
+            </a:r>
+            <a:endParaRPr lang="da-DK" dirty="0"/>
+          </a:p>
+        </p:txBody>
+      </p:sp>
+    </p:spTree>
+    <p:extLst>
+      <p:ext uri="{BB962C8B-B14F-4D97-AF65-F5344CB8AC3E}">
+        <p14:creationId xmlns:p14="http://schemas.microsoft.com/office/powerpoint/2010/main" val="2486359446"/>
+      </p:ext>
+    </p:extLst>
+  </p:cSld>
+  <p:clrMapOvr>
+    <a:masterClrMapping/>
+  </p:clrMapOvr>
+</p:sld>
+</file>
+
+<file path=ppt/slides/slide7.xml><?xml version="1.0" encoding="utf-8"?>
+<p:sld xmlns:a="http://schemas.openxmlformats.org/drawingml/2006/main" xmlns:r="http://schemas.openxmlformats.org/officeDocument/2006/relationships" xmlns:p="http://schemas.openxmlformats.org/presentationml/2006/main">
+  <p:cSld>
+    <p:spTree>
+      <p:nvGrpSpPr>
+        <p:cNvPr id="1" name=""/>
+        <p:cNvGrpSpPr/>
+        <p:nvPr/>
+      </p:nvGrpSpPr>
+      <p:grpSpPr>
+        <a:xfrm>
+          <a:off x="0" y="0"/>
+          <a:ext cx="0" cy="0"/>
+          <a:chOff x="0" y="0"/>
+          <a:chExt cx="0" cy="0"/>
+        </a:xfrm>
+      </p:grpSpPr>
+      <p:sp>
+        <p:nvSpPr>
+          <p:cNvPr id="2" name="Title 1"/>
+          <p:cNvSpPr>
+            <a:spLocks noGrp="1"/>
+          </p:cNvSpPr>
+          <p:nvPr>
+            <p:ph type="title"/>
+          </p:nvPr>
+        </p:nvSpPr>
+        <p:spPr/>
+        <p:txBody>
+          <a:bodyPr/>
+          <a:lstStyle/>
+          <a:p>
+            <a:r>
+              <a:rPr lang="en-US" dirty="0" smtClean="0"/>
+              <a:t>Augmenting the Dataset</a:t>
+            </a:r>
+            <a:br>
+              <a:rPr lang="en-US" dirty="0" smtClean="0"/>
+            </a:br>
+            <a:r>
+              <a:rPr lang="en-US" sz="2000" dirty="0" smtClean="0"/>
+              <a:t>Body type mapping</a:t>
+            </a:r>
+            <a:endParaRPr lang="da-DK" dirty="0"/>
+          </a:p>
+        </p:txBody>
+      </p:sp>
+      <p:graphicFrame>
+        <p:nvGraphicFramePr>
+          <p:cNvPr id="5" name="Content Placeholder 4"/>
+          <p:cNvGraphicFramePr>
+            <a:graphicFrameLocks noGrp="1"/>
+          </p:cNvGraphicFramePr>
+          <p:nvPr>
+            <p:ph sz="half" idx="1"/>
+            <p:extLst>
+              <p:ext uri="{D42A27DB-BD31-4B8C-83A1-F6EECF244321}">
+                <p14:modId xmlns:p14="http://schemas.microsoft.com/office/powerpoint/2010/main" val="4020768832"/>
+              </p:ext>
+            </p:extLst>
+          </p:nvPr>
+        </p:nvGraphicFramePr>
+        <p:xfrm>
+          <a:off x="838200" y="1690688"/>
+          <a:ext cx="4241799" cy="4450080"/>
+        </p:xfrm>
+        <a:graphic>
+          <a:graphicData uri="http://schemas.openxmlformats.org/drawingml/2006/table">
+            <a:tbl>
+              <a:tblPr firstRow="1" bandRow="1">
+                <a:tableStyleId>{5C22544A-7EE6-4342-B048-85BDC9FD1C3A}</a:tableStyleId>
+              </a:tblPr>
+              <a:tblGrid>
+                <a:gridCol w="918029">
+                  <a:extLst>
+                    <a:ext uri="{9D8B030D-6E8A-4147-A177-3AD203B41FA5}">
+                      <a16:colId xmlns:a16="http://schemas.microsoft.com/office/drawing/2014/main" val="2072441976"/>
+                    </a:ext>
+                  </a:extLst>
+                </a:gridCol>
+                <a:gridCol w="1909837">
+                  <a:extLst>
+                    <a:ext uri="{9D8B030D-6E8A-4147-A177-3AD203B41FA5}">
+                      <a16:colId xmlns:a16="http://schemas.microsoft.com/office/drawing/2014/main" val="4092204706"/>
+                    </a:ext>
+                  </a:extLst>
+                </a:gridCol>
+                <a:gridCol w="1413933">
+                  <a:extLst>
+                    <a:ext uri="{9D8B030D-6E8A-4147-A177-3AD203B41FA5}">
+                      <a16:colId xmlns:a16="http://schemas.microsoft.com/office/drawing/2014/main" val="3140183693"/>
+                    </a:ext>
+                  </a:extLst>
+                </a:gridCol>
+              </a:tblGrid>
+              <a:tr h="370840">
+                <a:tc>
+                  <a:txBody>
+                    <a:bodyPr/>
+                    <a:lstStyle/>
+                    <a:p>
+                      <a:r>
+                        <a:rPr lang="da-DK" dirty="0" smtClean="0"/>
+                        <a:t>User</a:t>
+                      </a:r>
+                      <a:endParaRPr lang="da-DK" dirty="0"/>
+                    </a:p>
+                  </a:txBody>
+                  <a:tcPr/>
+                </a:tc>
+                <a:tc>
+                  <a:txBody>
+                    <a:bodyPr/>
+                    <a:lstStyle/>
+                    <a:p>
+                      <a:r>
+                        <a:rPr lang="da-DK" dirty="0" smtClean="0"/>
+                        <a:t>Body type</a:t>
+                      </a:r>
+                      <a:endParaRPr lang="da-DK" dirty="0"/>
+                    </a:p>
+                  </a:txBody>
+                  <a:tcPr/>
+                </a:tc>
+                <a:tc>
+                  <a:txBody>
+                    <a:bodyPr/>
+                    <a:lstStyle/>
+                    <a:p>
+                      <a:r>
+                        <a:rPr lang="da-DK" dirty="0" smtClean="0"/>
+                        <a:t>Body form</a:t>
+                      </a:r>
+                      <a:endParaRPr lang="da-DK" dirty="0"/>
+                    </a:p>
+                  </a:txBody>
+                  <a:tcPr/>
+                </a:tc>
+                <a:extLst>
+                  <a:ext uri="{0D108BD9-81ED-4DB2-BD59-A6C34878D82A}">
+                    <a16:rowId xmlns:a16="http://schemas.microsoft.com/office/drawing/2014/main" val="2320993942"/>
+                  </a:ext>
+                </a:extLst>
+              </a:tr>
+              <a:tr h="370840">
+                <a:tc>
+                  <a:txBody>
+                    <a:bodyPr/>
+                    <a:lstStyle/>
+                    <a:p>
+                      <a:r>
+                        <a:rPr lang="da-DK" b="1" dirty="0" smtClean="0"/>
+                        <a:t>0</a:t>
+                      </a:r>
+                      <a:endParaRPr lang="da-DK" b="1" dirty="0"/>
+                    </a:p>
+                  </a:txBody>
+                  <a:tcPr/>
+                </a:tc>
+                <a:tc>
+                  <a:txBody>
+                    <a:bodyPr/>
+                    <a:lstStyle/>
+                    <a:p>
+                      <a:r>
+                        <a:rPr lang="da-DK" dirty="0" err="1" smtClean="0"/>
+                        <a:t>Overweight</a:t>
+                      </a:r>
+                      <a:endParaRPr lang="da-DK" dirty="0"/>
+                    </a:p>
+                  </a:txBody>
+                  <a:tcPr/>
+                </a:tc>
+                <a:tc>
+                  <a:txBody>
+                    <a:bodyPr/>
+                    <a:lstStyle/>
+                    <a:p>
+                      <a:r>
+                        <a:rPr lang="da-DK" dirty="0" smtClean="0"/>
+                        <a:t>0</a:t>
+                      </a:r>
+                      <a:endParaRPr lang="da-DK" dirty="0"/>
+                    </a:p>
+                  </a:txBody>
+                  <a:tcPr/>
+                </a:tc>
+                <a:extLst>
+                  <a:ext uri="{0D108BD9-81ED-4DB2-BD59-A6C34878D82A}">
+                    <a16:rowId xmlns:a16="http://schemas.microsoft.com/office/drawing/2014/main" val="3967622235"/>
+                  </a:ext>
+                </a:extLst>
+              </a:tr>
+              <a:tr h="370840">
+                <a:tc>
+                  <a:txBody>
+                    <a:bodyPr/>
+                    <a:lstStyle/>
+                    <a:p>
+                      <a:r>
+                        <a:rPr lang="da-DK" b="1" dirty="0" smtClean="0"/>
+                        <a:t>1</a:t>
+                      </a:r>
+                      <a:endParaRPr lang="da-DK" b="1" dirty="0"/>
+                    </a:p>
+                  </a:txBody>
+                  <a:tcPr/>
+                </a:tc>
+                <a:tc>
+                  <a:txBody>
+                    <a:bodyPr/>
+                    <a:lstStyle/>
+                    <a:p>
+                      <a:r>
+                        <a:rPr lang="da-DK" dirty="0" smtClean="0"/>
+                        <a:t>Full </a:t>
+                      </a:r>
+                      <a:r>
+                        <a:rPr lang="da-DK" dirty="0" err="1" smtClean="0"/>
+                        <a:t>figured</a:t>
+                      </a:r>
+                      <a:endParaRPr lang="da-DK" dirty="0"/>
+                    </a:p>
+                  </a:txBody>
+                  <a:tcPr/>
+                </a:tc>
+                <a:tc>
+                  <a:txBody>
+                    <a:bodyPr/>
+                    <a:lstStyle/>
+                    <a:p>
+                      <a:r>
+                        <a:rPr lang="da-DK" dirty="0" smtClean="0"/>
+                        <a:t>0</a:t>
+                      </a:r>
+                      <a:endParaRPr lang="da-DK" dirty="0"/>
+                    </a:p>
+                  </a:txBody>
+                  <a:tcPr/>
+                </a:tc>
+                <a:extLst>
+                  <a:ext uri="{0D108BD9-81ED-4DB2-BD59-A6C34878D82A}">
+                    <a16:rowId xmlns:a16="http://schemas.microsoft.com/office/drawing/2014/main" val="3997787615"/>
+                  </a:ext>
+                </a:extLst>
+              </a:tr>
+              <a:tr h="370840">
+                <a:tc>
+                  <a:txBody>
+                    <a:bodyPr/>
+                    <a:lstStyle/>
+                    <a:p>
+                      <a:r>
+                        <a:rPr lang="da-DK" b="1" dirty="0" smtClean="0"/>
+                        <a:t>2</a:t>
+                      </a:r>
+                      <a:endParaRPr lang="da-DK" b="1" dirty="0"/>
+                    </a:p>
+                  </a:txBody>
+                  <a:tcPr/>
+                </a:tc>
+                <a:tc>
+                  <a:txBody>
+                    <a:bodyPr/>
+                    <a:lstStyle/>
+                    <a:p>
+                      <a:r>
+                        <a:rPr lang="da-DK" dirty="0" err="1" smtClean="0"/>
+                        <a:t>Used</a:t>
+                      </a:r>
+                      <a:r>
+                        <a:rPr lang="da-DK" baseline="0" dirty="0" smtClean="0"/>
+                        <a:t> up</a:t>
+                      </a:r>
+                      <a:endParaRPr lang="da-DK" dirty="0"/>
+                    </a:p>
+                  </a:txBody>
+                  <a:tcPr/>
+                </a:tc>
+                <a:tc>
+                  <a:txBody>
+                    <a:bodyPr/>
+                    <a:lstStyle/>
+                    <a:p>
+                      <a:r>
+                        <a:rPr lang="da-DK" dirty="0" smtClean="0"/>
+                        <a:t>0</a:t>
+                      </a:r>
+                      <a:endParaRPr lang="da-DK" dirty="0"/>
+                    </a:p>
+                  </a:txBody>
+                  <a:tcPr/>
+                </a:tc>
+                <a:extLst>
+                  <a:ext uri="{0D108BD9-81ED-4DB2-BD59-A6C34878D82A}">
+                    <a16:rowId xmlns:a16="http://schemas.microsoft.com/office/drawing/2014/main" val="2407477255"/>
+                  </a:ext>
+                </a:extLst>
+              </a:tr>
+              <a:tr h="370840">
+                <a:tc>
+                  <a:txBody>
+                    <a:bodyPr/>
+                    <a:lstStyle/>
+                    <a:p>
+                      <a:r>
+                        <a:rPr lang="da-DK" b="1" dirty="0" smtClean="0"/>
+                        <a:t>3</a:t>
+                      </a:r>
+                      <a:endParaRPr lang="da-DK" b="1" dirty="0"/>
+                    </a:p>
+                  </a:txBody>
+                  <a:tcPr/>
+                </a:tc>
+                <a:tc>
+                  <a:txBody>
+                    <a:bodyPr/>
+                    <a:lstStyle/>
+                    <a:p>
+                      <a:r>
+                        <a:rPr lang="da-DK" dirty="0" smtClean="0"/>
+                        <a:t>A </a:t>
+                      </a:r>
+                      <a:r>
+                        <a:rPr lang="da-DK" dirty="0" err="1" smtClean="0"/>
+                        <a:t>little</a:t>
+                      </a:r>
+                      <a:r>
+                        <a:rPr lang="da-DK" dirty="0" smtClean="0"/>
+                        <a:t> </a:t>
+                      </a:r>
+                      <a:r>
+                        <a:rPr lang="da-DK" dirty="0" err="1" smtClean="0"/>
+                        <a:t>extra</a:t>
+                      </a:r>
+                      <a:endParaRPr lang="da-DK" dirty="0"/>
+                    </a:p>
+                  </a:txBody>
+                  <a:tcPr/>
+                </a:tc>
+                <a:tc>
+                  <a:txBody>
+                    <a:bodyPr/>
+                    <a:lstStyle/>
+                    <a:p>
+                      <a:r>
+                        <a:rPr lang="da-DK" dirty="0" smtClean="0"/>
+                        <a:t>0</a:t>
+                      </a:r>
+                      <a:endParaRPr lang="da-DK" dirty="0"/>
+                    </a:p>
+                  </a:txBody>
+                  <a:tcPr/>
+                </a:tc>
+                <a:extLst>
+                  <a:ext uri="{0D108BD9-81ED-4DB2-BD59-A6C34878D82A}">
+                    <a16:rowId xmlns:a16="http://schemas.microsoft.com/office/drawing/2014/main" val="432184142"/>
+                  </a:ext>
+                </a:extLst>
+              </a:tr>
+              <a:tr h="370840">
+                <a:tc>
+                  <a:txBody>
+                    <a:bodyPr/>
+                    <a:lstStyle/>
+                    <a:p>
+                      <a:r>
+                        <a:rPr lang="da-DK" b="1" dirty="0" smtClean="0"/>
+                        <a:t>4</a:t>
+                      </a:r>
+                      <a:endParaRPr lang="da-DK" b="1" dirty="0"/>
+                    </a:p>
+                  </a:txBody>
+                  <a:tcPr/>
+                </a:tc>
+                <a:tc>
+                  <a:txBody>
+                    <a:bodyPr/>
+                    <a:lstStyle/>
+                    <a:p>
+                      <a:r>
+                        <a:rPr lang="da-DK" dirty="0" err="1" smtClean="0"/>
+                        <a:t>Curvy</a:t>
+                      </a:r>
+                      <a:endParaRPr lang="da-DK" dirty="0"/>
+                    </a:p>
+                  </a:txBody>
+                  <a:tcPr/>
+                </a:tc>
+                <a:tc>
+                  <a:txBody>
+                    <a:bodyPr/>
+                    <a:lstStyle/>
+                    <a:p>
+                      <a:r>
+                        <a:rPr lang="da-DK" dirty="0" smtClean="0"/>
+                        <a:t>0</a:t>
+                      </a:r>
+                      <a:endParaRPr lang="da-DK" dirty="0"/>
+                    </a:p>
+                  </a:txBody>
+                  <a:tcPr/>
+                </a:tc>
+                <a:extLst>
+                  <a:ext uri="{0D108BD9-81ED-4DB2-BD59-A6C34878D82A}">
+                    <a16:rowId xmlns:a16="http://schemas.microsoft.com/office/drawing/2014/main" val="432828981"/>
+                  </a:ext>
+                </a:extLst>
+              </a:tr>
+              <a:tr h="370840">
+                <a:tc>
+                  <a:txBody>
+                    <a:bodyPr/>
+                    <a:lstStyle/>
+                    <a:p>
+                      <a:r>
+                        <a:rPr lang="da-DK" b="1" dirty="0" smtClean="0"/>
+                        <a:t>5</a:t>
+                      </a:r>
+                      <a:endParaRPr lang="da-DK" b="1" dirty="0"/>
+                    </a:p>
+                  </a:txBody>
+                  <a:tcPr/>
+                </a:tc>
+                <a:tc>
+                  <a:txBody>
+                    <a:bodyPr/>
+                    <a:lstStyle/>
+                    <a:p>
+                      <a:r>
+                        <a:rPr lang="da-DK" dirty="0" smtClean="0"/>
+                        <a:t>Average</a:t>
+                      </a:r>
+                      <a:endParaRPr lang="da-DK" dirty="0"/>
+                    </a:p>
+                  </a:txBody>
+                  <a:tcPr/>
+                </a:tc>
+                <a:tc>
+                  <a:txBody>
+                    <a:bodyPr/>
+                    <a:lstStyle/>
+                    <a:p>
+                      <a:r>
+                        <a:rPr lang="da-DK" dirty="0" smtClean="0"/>
+                        <a:t>1</a:t>
+                      </a:r>
+                      <a:endParaRPr lang="da-DK" dirty="0"/>
+                    </a:p>
+                  </a:txBody>
+                  <a:tcPr/>
+                </a:tc>
+                <a:extLst>
+                  <a:ext uri="{0D108BD9-81ED-4DB2-BD59-A6C34878D82A}">
+                    <a16:rowId xmlns:a16="http://schemas.microsoft.com/office/drawing/2014/main" val="1421769050"/>
+                  </a:ext>
+                </a:extLst>
+              </a:tr>
+              <a:tr h="370840">
+                <a:tc>
+                  <a:txBody>
+                    <a:bodyPr/>
+                    <a:lstStyle/>
+                    <a:p>
+                      <a:r>
+                        <a:rPr lang="da-DK" b="1" dirty="0" smtClean="0"/>
+                        <a:t>6</a:t>
+                      </a:r>
+                      <a:endParaRPr lang="da-DK" b="1" dirty="0"/>
+                    </a:p>
+                  </a:txBody>
+                  <a:tcPr/>
+                </a:tc>
+                <a:tc>
+                  <a:txBody>
+                    <a:bodyPr/>
+                    <a:lstStyle/>
+                    <a:p>
+                      <a:r>
+                        <a:rPr lang="da-DK" dirty="0" err="1" smtClean="0"/>
+                        <a:t>Skinny</a:t>
+                      </a:r>
+                      <a:endParaRPr lang="da-DK" dirty="0"/>
+                    </a:p>
+                  </a:txBody>
+                  <a:tcPr/>
+                </a:tc>
+                <a:tc>
+                  <a:txBody>
+                    <a:bodyPr/>
+                    <a:lstStyle/>
+                    <a:p>
+                      <a:r>
+                        <a:rPr lang="da-DK" dirty="0" smtClean="0"/>
+                        <a:t>1</a:t>
+                      </a:r>
+                      <a:endParaRPr lang="da-DK" dirty="0"/>
+                    </a:p>
+                  </a:txBody>
+                  <a:tcPr/>
+                </a:tc>
+                <a:extLst>
+                  <a:ext uri="{0D108BD9-81ED-4DB2-BD59-A6C34878D82A}">
+                    <a16:rowId xmlns:a16="http://schemas.microsoft.com/office/drawing/2014/main" val="438140524"/>
+                  </a:ext>
+                </a:extLst>
+              </a:tr>
+              <a:tr h="370840">
+                <a:tc>
+                  <a:txBody>
+                    <a:bodyPr/>
+                    <a:lstStyle/>
+                    <a:p>
+                      <a:r>
+                        <a:rPr lang="da-DK" b="1" dirty="0" smtClean="0"/>
+                        <a:t>7</a:t>
+                      </a:r>
+                      <a:endParaRPr lang="da-DK" b="1" dirty="0"/>
+                    </a:p>
+                  </a:txBody>
+                  <a:tcPr/>
+                </a:tc>
+                <a:tc>
+                  <a:txBody>
+                    <a:bodyPr/>
+                    <a:lstStyle/>
+                    <a:p>
+                      <a:r>
+                        <a:rPr lang="da-DK" dirty="0" err="1" smtClean="0"/>
+                        <a:t>Fit</a:t>
+                      </a:r>
+                      <a:endParaRPr lang="da-DK" dirty="0"/>
+                    </a:p>
+                  </a:txBody>
+                  <a:tcPr/>
+                </a:tc>
+                <a:tc>
+                  <a:txBody>
+                    <a:bodyPr/>
+                    <a:lstStyle/>
+                    <a:p>
+                      <a:r>
+                        <a:rPr lang="da-DK" dirty="0" smtClean="0"/>
+                        <a:t>2</a:t>
+                      </a:r>
+                      <a:endParaRPr lang="da-DK" dirty="0"/>
+                    </a:p>
+                  </a:txBody>
+                  <a:tcPr/>
+                </a:tc>
+                <a:extLst>
+                  <a:ext uri="{0D108BD9-81ED-4DB2-BD59-A6C34878D82A}">
+                    <a16:rowId xmlns:a16="http://schemas.microsoft.com/office/drawing/2014/main" val="1897393529"/>
+                  </a:ext>
+                </a:extLst>
+              </a:tr>
+              <a:tr h="370840">
+                <a:tc>
+                  <a:txBody>
+                    <a:bodyPr/>
+                    <a:lstStyle/>
+                    <a:p>
+                      <a:r>
+                        <a:rPr lang="da-DK" b="1" dirty="0" smtClean="0"/>
+                        <a:t>8</a:t>
+                      </a:r>
+                      <a:endParaRPr lang="da-DK" b="1" dirty="0"/>
+                    </a:p>
+                  </a:txBody>
+                  <a:tcPr/>
+                </a:tc>
+                <a:tc>
+                  <a:txBody>
+                    <a:bodyPr/>
+                    <a:lstStyle/>
+                    <a:p>
+                      <a:r>
+                        <a:rPr lang="da-DK" dirty="0" err="1" smtClean="0"/>
+                        <a:t>Athletic</a:t>
+                      </a:r>
+                      <a:endParaRPr lang="da-DK" dirty="0"/>
+                    </a:p>
+                  </a:txBody>
+                  <a:tcPr/>
+                </a:tc>
+                <a:tc>
+                  <a:txBody>
+                    <a:bodyPr/>
+                    <a:lstStyle/>
+                    <a:p>
+                      <a:r>
+                        <a:rPr lang="da-DK" dirty="0" smtClean="0"/>
+                        <a:t>2</a:t>
+                      </a:r>
+                      <a:endParaRPr lang="da-DK" dirty="0"/>
+                    </a:p>
+                  </a:txBody>
+                  <a:tcPr/>
+                </a:tc>
+                <a:extLst>
+                  <a:ext uri="{0D108BD9-81ED-4DB2-BD59-A6C34878D82A}">
+                    <a16:rowId xmlns:a16="http://schemas.microsoft.com/office/drawing/2014/main" val="4090099013"/>
+                  </a:ext>
+                </a:extLst>
+              </a:tr>
+              <a:tr h="370840">
+                <a:tc>
+                  <a:txBody>
+                    <a:bodyPr/>
+                    <a:lstStyle/>
+                    <a:p>
+                      <a:r>
+                        <a:rPr lang="da-DK" b="1" dirty="0" smtClean="0"/>
+                        <a:t>9</a:t>
+                      </a:r>
+                      <a:endParaRPr lang="da-DK" b="1" dirty="0"/>
+                    </a:p>
+                  </a:txBody>
+                  <a:tcPr/>
+                </a:tc>
+                <a:tc>
+                  <a:txBody>
+                    <a:bodyPr/>
+                    <a:lstStyle/>
+                    <a:p>
+                      <a:r>
+                        <a:rPr lang="da-DK" dirty="0" err="1" smtClean="0"/>
+                        <a:t>Thin</a:t>
+                      </a:r>
+                      <a:endParaRPr lang="da-DK" dirty="0"/>
+                    </a:p>
+                  </a:txBody>
+                  <a:tcPr/>
+                </a:tc>
+                <a:tc>
+                  <a:txBody>
+                    <a:bodyPr/>
+                    <a:lstStyle/>
+                    <a:p>
+                      <a:r>
+                        <a:rPr lang="da-DK" dirty="0" smtClean="0"/>
+                        <a:t>2</a:t>
+                      </a:r>
+                      <a:endParaRPr lang="da-DK" dirty="0"/>
+                    </a:p>
+                  </a:txBody>
+                  <a:tcPr/>
+                </a:tc>
+                <a:extLst>
+                  <a:ext uri="{0D108BD9-81ED-4DB2-BD59-A6C34878D82A}">
+                    <a16:rowId xmlns:a16="http://schemas.microsoft.com/office/drawing/2014/main" val="32459515"/>
+                  </a:ext>
+                </a:extLst>
+              </a:tr>
+              <a:tr h="370840">
+                <a:tc>
+                  <a:txBody>
+                    <a:bodyPr/>
+                    <a:lstStyle/>
+                    <a:p>
+                      <a:r>
+                        <a:rPr lang="da-DK" b="1" dirty="0" smtClean="0"/>
+                        <a:t>10</a:t>
+                      </a:r>
+                      <a:endParaRPr lang="da-DK" b="1" dirty="0"/>
+                    </a:p>
+                  </a:txBody>
+                  <a:tcPr/>
+                </a:tc>
+                <a:tc>
+                  <a:txBody>
+                    <a:bodyPr/>
+                    <a:lstStyle/>
+                    <a:p>
+                      <a:r>
+                        <a:rPr lang="da-DK" dirty="0" err="1" smtClean="0"/>
+                        <a:t>Jacked</a:t>
+                      </a:r>
+                      <a:endParaRPr lang="da-DK" dirty="0"/>
+                    </a:p>
+                  </a:txBody>
+                  <a:tcPr/>
+                </a:tc>
+                <a:tc>
+                  <a:txBody>
+                    <a:bodyPr/>
+                    <a:lstStyle/>
+                    <a:p>
+                      <a:r>
+                        <a:rPr lang="da-DK" dirty="0" smtClean="0"/>
+                        <a:t>2</a:t>
+                      </a:r>
+                      <a:endParaRPr lang="da-DK" dirty="0"/>
+                    </a:p>
+                  </a:txBody>
+                  <a:tcPr/>
+                </a:tc>
+                <a:extLst>
+                  <a:ext uri="{0D108BD9-81ED-4DB2-BD59-A6C34878D82A}">
+                    <a16:rowId xmlns:a16="http://schemas.microsoft.com/office/drawing/2014/main" val="2864808755"/>
+                  </a:ext>
+                </a:extLst>
+              </a:tr>
+            </a:tbl>
+          </a:graphicData>
+        </a:graphic>
+      </p:graphicFrame>
+      <p:sp>
+        <p:nvSpPr>
+          <p:cNvPr id="6" name="TextBox 5"/>
+          <p:cNvSpPr txBox="1"/>
+          <p:nvPr/>
+        </p:nvSpPr>
+        <p:spPr>
+          <a:xfrm>
+            <a:off x="5312228" y="1690688"/>
+            <a:ext cx="6041572" cy="2031325"/>
+          </a:xfrm>
+          <a:prstGeom prst="rect">
+            <a:avLst/>
+          </a:prstGeom>
+          <a:noFill/>
+        </p:spPr>
+        <p:txBody>
+          <a:bodyPr wrap="square" rtlCol="0">
+            <a:spAutoFit/>
+          </a:bodyPr>
+          <a:lstStyle/>
+          <a:p>
+            <a:r>
+              <a:rPr lang="en-US" dirty="0" smtClean="0"/>
+              <a:t>I thought that the body type would have impact on which diet the user is doing. The body types defined in the dataset is not very describable, so I chose to split it up in three categories, where the higher the number it is, the better the form.</a:t>
+            </a:r>
+          </a:p>
+          <a:p>
+            <a:r>
+              <a:rPr lang="en-US" dirty="0"/>
+              <a:t/>
+            </a:r>
+            <a:br>
+              <a:rPr lang="en-US" dirty="0"/>
+            </a:br>
+            <a:r>
+              <a:rPr lang="en-US" dirty="0" smtClean="0"/>
+              <a:t>The table to the left shows how the data has been mapped into the new “Body form” column.</a:t>
+            </a:r>
+            <a:endParaRPr lang="en-US" dirty="0"/>
+          </a:p>
+        </p:txBody>
+      </p:sp>
+    </p:spTree>
+    <p:extLst>
+      <p:ext uri="{BB962C8B-B14F-4D97-AF65-F5344CB8AC3E}">
+        <p14:creationId xmlns:p14="http://schemas.microsoft.com/office/powerpoint/2010/main" val="4102536553"/>
       </p:ext>
     </p:extLst>
   </p:cSld>

</xml_diff>